<commit_message>
Edits & blog post
</commit_message>
<xml_diff>
--- a/img/pic.pptx
+++ b/img/pic.pptx
@@ -104,6 +104,11 @@
       </a:defRPr>
     </a:lvl9pPr>
   </p:defaultTextStyle>
+  <p:extLst>
+    <p:ext uri="{EFAFB233-063F-42B5-8137-9DF3F51BA10A}">
+      <p15:sldGuideLst xmlns:p15="http://schemas.microsoft.com/office/powerpoint/2012/main"/>
+    </p:ext>
+  </p:extLst>
 </p:presentation>
 </file>
 
@@ -3403,7 +3408,7 @@
         </p:nvSpPr>
         <p:spPr>
           <a:xfrm>
-            <a:off x="204187" y="2175030"/>
+            <a:off x="1277207" y="1475234"/>
             <a:ext cx="5708342" cy="1828800"/>
           </a:xfrm>
           <a:prstGeom prst="rect">

</xml_diff>